<commit_message>
QA or the Highway tweaks
</commit_message>
<xml_diff>
--- a/Intro.pptx
+++ b/Intro.pptx
@@ -3009,7 +3009,7 @@
           <a:p>
             <a:fld id="{C54A4886-B4AF-42F7-97BE-95CDF82A73E3}" type="datetimeFigureOut">
               <a:rPr lang="en-US" smtClean="0"/>
-              <a:t>1/10/2019</a:t>
+              <a:t>2/18/2019</a:t>
             </a:fld>
             <a:endParaRPr lang="en-US"/>
           </a:p>
@@ -6681,7 +6681,7 @@
           <a:p>
             <a:fld id="{75AA6396-395E-4ADA-8EE5-F328BC863A04}" type="datetimeFigureOut">
               <a:rPr lang="en-US" smtClean="0"/>
-              <a:t>1/10/2019</a:t>
+              <a:t>2/18/2019</a:t>
             </a:fld>
             <a:endParaRPr lang="en-US"/>
           </a:p>
@@ -6739,11 +6739,11 @@
   <p:clrMapOvr>
     <a:masterClrMapping/>
   </p:clrMapOvr>
-  <mc:AlternateContent xmlns:mc="http://schemas.openxmlformats.org/markup-compatibility/2006">
-    <mc:Choice xmlns:p14="http://schemas.microsoft.com/office/powerpoint/2010/main" Requires="p14">
+  <mc:AlternateContent xmlns:mc="http://schemas.openxmlformats.org/markup-compatibility/2006" xmlns:p14="http://schemas.microsoft.com/office/powerpoint/2010/main">
+    <mc:Choice Requires="p14">
       <p:transition p14:dur="10" advClick="0" advTm="10000"/>
     </mc:Choice>
-    <mc:Fallback>
+    <mc:Fallback xmlns="">
       <p:transition advClick="0" advTm="10000"/>
     </mc:Fallback>
   </mc:AlternateContent>
@@ -6857,7 +6857,7 @@
           <a:p>
             <a:fld id="{75AA6396-395E-4ADA-8EE5-F328BC863A04}" type="datetimeFigureOut">
               <a:rPr lang="en-US" smtClean="0"/>
-              <a:t>1/10/2019</a:t>
+              <a:t>2/18/2019</a:t>
             </a:fld>
             <a:endParaRPr lang="en-US"/>
           </a:p>
@@ -6915,11 +6915,11 @@
   <p:clrMapOvr>
     <a:masterClrMapping/>
   </p:clrMapOvr>
-  <mc:AlternateContent xmlns:mc="http://schemas.openxmlformats.org/markup-compatibility/2006">
-    <mc:Choice xmlns:p14="http://schemas.microsoft.com/office/powerpoint/2010/main" Requires="p14">
+  <mc:AlternateContent xmlns:mc="http://schemas.openxmlformats.org/markup-compatibility/2006" xmlns:p14="http://schemas.microsoft.com/office/powerpoint/2010/main">
+    <mc:Choice Requires="p14">
       <p:transition p14:dur="10" advClick="0" advTm="10000"/>
     </mc:Choice>
-    <mc:Fallback>
+    <mc:Fallback xmlns="">
       <p:transition advClick="0" advTm="10000"/>
     </mc:Fallback>
   </mc:AlternateContent>
@@ -7043,7 +7043,7 @@
           <a:p>
             <a:fld id="{75AA6396-395E-4ADA-8EE5-F328BC863A04}" type="datetimeFigureOut">
               <a:rPr lang="en-US" smtClean="0"/>
-              <a:t>1/10/2019</a:t>
+              <a:t>2/18/2019</a:t>
             </a:fld>
             <a:endParaRPr lang="en-US"/>
           </a:p>
@@ -7101,11 +7101,11 @@
   <p:clrMapOvr>
     <a:masterClrMapping/>
   </p:clrMapOvr>
-  <mc:AlternateContent xmlns:mc="http://schemas.openxmlformats.org/markup-compatibility/2006">
-    <mc:Choice xmlns:p14="http://schemas.microsoft.com/office/powerpoint/2010/main" Requires="p14">
+  <mc:AlternateContent xmlns:mc="http://schemas.openxmlformats.org/markup-compatibility/2006" xmlns:p14="http://schemas.microsoft.com/office/powerpoint/2010/main">
+    <mc:Choice Requires="p14">
       <p:transition p14:dur="10" advClick="0" advTm="10000"/>
     </mc:Choice>
-    <mc:Fallback>
+    <mc:Fallback xmlns="">
       <p:transition advClick="0" advTm="10000"/>
     </mc:Fallback>
   </mc:AlternateContent>
@@ -7269,7 +7269,7 @@
           <a:p>
             <a:fld id="{75AA6396-395E-4ADA-8EE5-F328BC863A04}" type="datetimeFigureOut">
               <a:rPr lang="en-US" smtClean="0"/>
-              <a:t>1/10/2019</a:t>
+              <a:t>2/18/2019</a:t>
             </a:fld>
             <a:endParaRPr lang="en-US"/>
           </a:p>
@@ -7327,11 +7327,11 @@
   <p:clrMapOvr>
     <a:masterClrMapping/>
   </p:clrMapOvr>
-  <mc:AlternateContent xmlns:mc="http://schemas.openxmlformats.org/markup-compatibility/2006">
-    <mc:Choice xmlns:p14="http://schemas.microsoft.com/office/powerpoint/2010/main" Requires="p14">
+  <mc:AlternateContent xmlns:mc="http://schemas.openxmlformats.org/markup-compatibility/2006" xmlns:p14="http://schemas.microsoft.com/office/powerpoint/2010/main">
+    <mc:Choice Requires="p14">
       <p:transition p14:dur="10" advClick="0" advTm="10000"/>
     </mc:Choice>
-    <mc:Fallback>
+    <mc:Fallback xmlns="">
       <p:transition advClick="0" advTm="10000"/>
     </mc:Fallback>
   </mc:AlternateContent>
@@ -7522,7 +7522,7 @@
           <a:p>
             <a:fld id="{75AA6396-395E-4ADA-8EE5-F328BC863A04}" type="datetimeFigureOut">
               <a:rPr lang="en-US" smtClean="0"/>
-              <a:t>1/10/2019</a:t>
+              <a:t>2/18/2019</a:t>
             </a:fld>
             <a:endParaRPr lang="en-US"/>
           </a:p>
@@ -7580,11 +7580,11 @@
   <p:clrMapOvr>
     <a:masterClrMapping/>
   </p:clrMapOvr>
-  <mc:AlternateContent xmlns:mc="http://schemas.openxmlformats.org/markup-compatibility/2006">
-    <mc:Choice xmlns:p14="http://schemas.microsoft.com/office/powerpoint/2010/main" Requires="p14">
+  <mc:AlternateContent xmlns:mc="http://schemas.openxmlformats.org/markup-compatibility/2006" xmlns:p14="http://schemas.microsoft.com/office/powerpoint/2010/main">
+    <mc:Choice Requires="p14">
       <p:transition p14:dur="10" advClick="0" advTm="10000"/>
     </mc:Choice>
-    <mc:Fallback>
+    <mc:Fallback xmlns="">
       <p:transition advClick="0" advTm="10000"/>
     </mc:Fallback>
   </mc:AlternateContent>
@@ -7759,7 +7759,7 @@
           <a:p>
             <a:fld id="{75AA6396-395E-4ADA-8EE5-F328BC863A04}" type="datetimeFigureOut">
               <a:rPr lang="en-US" smtClean="0"/>
-              <a:t>1/10/2019</a:t>
+              <a:t>2/18/2019</a:t>
             </a:fld>
             <a:endParaRPr lang="en-US"/>
           </a:p>
@@ -7817,11 +7817,11 @@
   <p:clrMapOvr>
     <a:masterClrMapping/>
   </p:clrMapOvr>
-  <mc:AlternateContent xmlns:mc="http://schemas.openxmlformats.org/markup-compatibility/2006">
-    <mc:Choice xmlns:p14="http://schemas.microsoft.com/office/powerpoint/2010/main" Requires="p14">
+  <mc:AlternateContent xmlns:mc="http://schemas.openxmlformats.org/markup-compatibility/2006" xmlns:p14="http://schemas.microsoft.com/office/powerpoint/2010/main">
+    <mc:Choice Requires="p14">
       <p:transition p14:dur="10" advClick="0" advTm="10000"/>
     </mc:Choice>
-    <mc:Fallback>
+    <mc:Fallback xmlns="">
       <p:transition advClick="0" advTm="10000"/>
     </mc:Fallback>
   </mc:AlternateContent>
@@ -8131,7 +8131,7 @@
           <a:p>
             <a:fld id="{75AA6396-395E-4ADA-8EE5-F328BC863A04}" type="datetimeFigureOut">
               <a:rPr lang="en-US" smtClean="0"/>
-              <a:t>1/10/2019</a:t>
+              <a:t>2/18/2019</a:t>
             </a:fld>
             <a:endParaRPr lang="en-US"/>
           </a:p>
@@ -8189,11 +8189,11 @@
   <p:clrMapOvr>
     <a:masterClrMapping/>
   </p:clrMapOvr>
-  <mc:AlternateContent xmlns:mc="http://schemas.openxmlformats.org/markup-compatibility/2006">
-    <mc:Choice xmlns:p14="http://schemas.microsoft.com/office/powerpoint/2010/main" Requires="p14">
+  <mc:AlternateContent xmlns:mc="http://schemas.openxmlformats.org/markup-compatibility/2006" xmlns:p14="http://schemas.microsoft.com/office/powerpoint/2010/main">
+    <mc:Choice Requires="p14">
       <p:transition p14:dur="10" advClick="0" advTm="10000"/>
     </mc:Choice>
-    <mc:Fallback>
+    <mc:Fallback xmlns="">
       <p:transition advClick="0" advTm="10000"/>
     </mc:Fallback>
   </mc:AlternateContent>
@@ -8256,7 +8256,7 @@
           <a:p>
             <a:fld id="{75AA6396-395E-4ADA-8EE5-F328BC863A04}" type="datetimeFigureOut">
               <a:rPr lang="en-US" smtClean="0"/>
-              <a:t>1/10/2019</a:t>
+              <a:t>2/18/2019</a:t>
             </a:fld>
             <a:endParaRPr lang="en-US"/>
           </a:p>
@@ -8314,11 +8314,11 @@
   <p:clrMapOvr>
     <a:masterClrMapping/>
   </p:clrMapOvr>
-  <mc:AlternateContent xmlns:mc="http://schemas.openxmlformats.org/markup-compatibility/2006">
-    <mc:Choice xmlns:p14="http://schemas.microsoft.com/office/powerpoint/2010/main" Requires="p14">
+  <mc:AlternateContent xmlns:mc="http://schemas.openxmlformats.org/markup-compatibility/2006" xmlns:p14="http://schemas.microsoft.com/office/powerpoint/2010/main">
+    <mc:Choice Requires="p14">
       <p:transition p14:dur="10" advClick="0" advTm="10000"/>
     </mc:Choice>
-    <mc:Fallback>
+    <mc:Fallback xmlns="">
       <p:transition advClick="0" advTm="10000"/>
     </mc:Fallback>
   </mc:AlternateContent>
@@ -8359,7 +8359,7 @@
           <a:p>
             <a:fld id="{75AA6396-395E-4ADA-8EE5-F328BC863A04}" type="datetimeFigureOut">
               <a:rPr lang="en-US" smtClean="0"/>
-              <a:t>1/10/2019</a:t>
+              <a:t>2/18/2019</a:t>
             </a:fld>
             <a:endParaRPr lang="en-US"/>
           </a:p>
@@ -8417,11 +8417,11 @@
   <p:clrMapOvr>
     <a:masterClrMapping/>
   </p:clrMapOvr>
-  <mc:AlternateContent xmlns:mc="http://schemas.openxmlformats.org/markup-compatibility/2006">
-    <mc:Choice xmlns:p14="http://schemas.microsoft.com/office/powerpoint/2010/main" Requires="p14">
+  <mc:AlternateContent xmlns:mc="http://schemas.openxmlformats.org/markup-compatibility/2006" xmlns:p14="http://schemas.microsoft.com/office/powerpoint/2010/main">
+    <mc:Choice Requires="p14">
       <p:transition p14:dur="10" advClick="0" advTm="10000"/>
     </mc:Choice>
-    <mc:Fallback>
+    <mc:Fallback xmlns="">
       <p:transition advClick="0" advTm="10000"/>
     </mc:Fallback>
   </mc:AlternateContent>
@@ -8642,7 +8642,7 @@
           <a:p>
             <a:fld id="{75AA6396-395E-4ADA-8EE5-F328BC863A04}" type="datetimeFigureOut">
               <a:rPr lang="en-US" smtClean="0"/>
-              <a:t>1/10/2019</a:t>
+              <a:t>2/18/2019</a:t>
             </a:fld>
             <a:endParaRPr lang="en-US"/>
           </a:p>
@@ -8700,11 +8700,11 @@
   <p:clrMapOvr>
     <a:masterClrMapping/>
   </p:clrMapOvr>
-  <mc:AlternateContent xmlns:mc="http://schemas.openxmlformats.org/markup-compatibility/2006">
-    <mc:Choice xmlns:p14="http://schemas.microsoft.com/office/powerpoint/2010/main" Requires="p14">
+  <mc:AlternateContent xmlns:mc="http://schemas.openxmlformats.org/markup-compatibility/2006" xmlns:p14="http://schemas.microsoft.com/office/powerpoint/2010/main">
+    <mc:Choice Requires="p14">
       <p:transition p14:dur="10" advClick="0" advTm="10000"/>
     </mc:Choice>
-    <mc:Fallback>
+    <mc:Fallback xmlns="">
       <p:transition advClick="0" advTm="10000"/>
     </mc:Fallback>
   </mc:AlternateContent>
@@ -8902,7 +8902,7 @@
           <a:p>
             <a:fld id="{75AA6396-395E-4ADA-8EE5-F328BC863A04}" type="datetimeFigureOut">
               <a:rPr lang="en-US" smtClean="0"/>
-              <a:t>1/10/2019</a:t>
+              <a:t>2/18/2019</a:t>
             </a:fld>
             <a:endParaRPr lang="en-US"/>
           </a:p>
@@ -8960,11 +8960,11 @@
   <p:clrMapOvr>
     <a:masterClrMapping/>
   </p:clrMapOvr>
-  <mc:AlternateContent xmlns:mc="http://schemas.openxmlformats.org/markup-compatibility/2006">
-    <mc:Choice xmlns:p14="http://schemas.microsoft.com/office/powerpoint/2010/main" Requires="p14">
+  <mc:AlternateContent xmlns:mc="http://schemas.openxmlformats.org/markup-compatibility/2006" xmlns:p14="http://schemas.microsoft.com/office/powerpoint/2010/main">
+    <mc:Choice Requires="p14">
       <p:transition p14:dur="10" advClick="0" advTm="10000"/>
     </mc:Choice>
-    <mc:Fallback>
+    <mc:Fallback xmlns="">
       <p:transition advClick="0" advTm="10000"/>
     </mc:Fallback>
   </mc:AlternateContent>
@@ -9121,7 +9121,7 @@
           <a:p>
             <a:fld id="{75AA6396-395E-4ADA-8EE5-F328BC863A04}" type="datetimeFigureOut">
               <a:rPr lang="en-US" smtClean="0"/>
-              <a:t>1/10/2019</a:t>
+              <a:t>2/18/2019</a:t>
             </a:fld>
             <a:endParaRPr lang="en-US"/>
           </a:p>
@@ -9226,11 +9226,11 @@
     <p:sldLayoutId id="2147483759" r:id="rId10"/>
     <p:sldLayoutId id="2147483760" r:id="rId11"/>
   </p:sldLayoutIdLst>
-  <mc:AlternateContent xmlns:mc="http://schemas.openxmlformats.org/markup-compatibility/2006">
-    <mc:Choice xmlns:p14="http://schemas.microsoft.com/office/powerpoint/2010/main" Requires="p14">
+  <mc:AlternateContent xmlns:mc="http://schemas.openxmlformats.org/markup-compatibility/2006" xmlns:p14="http://schemas.microsoft.com/office/powerpoint/2010/main">
+    <mc:Choice Requires="p14">
       <p:transition p14:dur="10" advClick="0" advTm="10000"/>
     </mc:Choice>
-    <mc:Fallback>
+    <mc:Fallback xmlns="">
       <p:transition advClick="0" advTm="10000"/>
     </mc:Fallback>
   </mc:AlternateContent>
@@ -10777,11 +10777,11 @@
   <p:clrMapOvr>
     <a:masterClrMapping/>
   </p:clrMapOvr>
-  <mc:AlternateContent xmlns:mc="http://schemas.openxmlformats.org/markup-compatibility/2006">
-    <mc:Choice xmlns:p14="http://schemas.microsoft.com/office/powerpoint/2010/main" Requires="p14">
+  <mc:AlternateContent xmlns:mc="http://schemas.openxmlformats.org/markup-compatibility/2006" xmlns:p14="http://schemas.microsoft.com/office/powerpoint/2010/main">
+    <mc:Choice Requires="p14">
       <p:transition p14:dur="10" advClick="0" advTm="10000"/>
     </mc:Choice>
-    <mc:Fallback>
+    <mc:Fallback xmlns="">
       <p:transition advClick="0" advTm="10000"/>
     </mc:Fallback>
   </mc:AlternateContent>
@@ -11019,7 +11019,7 @@
                 </a:solidFill>
                 <a:latin typeface="Corbel" panose="020B0503020204020204" pitchFamily="34" charset="0"/>
               </a:rPr>
-              <a:t>* 1 or 2 face-to-face days per month in Columbus, OH</a:t>
+              <a:t>* 2 or more face-to-face days per month in Columbus, OH</a:t>
             </a:r>
             <a:endParaRPr lang="en-US" sz="2800" dirty="0"/>
           </a:p>
@@ -11060,7 +11060,7 @@
             </a:r>
             <a:r>
               <a:rPr lang="en-US" sz="3200" b="1" dirty="0"/>
-              <a:t>WorkWithSeth</a:t>
+              <a:t>WFHTester</a:t>
             </a:r>
             <a:endParaRPr lang="en-US" sz="2800" b="1" dirty="0"/>
           </a:p>
@@ -11174,11 +11174,11 @@
   <p:clrMapOvr>
     <a:masterClrMapping/>
   </p:clrMapOvr>
-  <mc:AlternateContent xmlns:mc="http://schemas.openxmlformats.org/markup-compatibility/2006">
-    <mc:Choice xmlns:p14="http://schemas.microsoft.com/office/powerpoint/2010/main" Requires="p14">
+  <mc:AlternateContent xmlns:mc="http://schemas.openxmlformats.org/markup-compatibility/2006" xmlns:p14="http://schemas.microsoft.com/office/powerpoint/2010/main">
+    <mc:Choice Requires="p14">
       <p:transition p14:dur="10" advClick="0" advTm="10000"/>
     </mc:Choice>
-    <mc:Fallback>
+    <mc:Fallback xmlns="">
       <p:transition advClick="0" advTm="10000"/>
     </mc:Fallback>
   </mc:AlternateContent>
@@ -11416,7 +11416,7 @@
                 </a:solidFill>
                 <a:latin typeface="Corbel" panose="020B0503020204020204" pitchFamily="34" charset="0"/>
               </a:rPr>
-              <a:t>* 1 or 2 face-to-face days per month in Columbus, OH</a:t>
+              <a:t>* 2 or more face-to-face days per month in Columbus, OH</a:t>
             </a:r>
             <a:endParaRPr lang="en-US" sz="2800" dirty="0"/>
           </a:p>
@@ -11457,7 +11457,7 @@
             </a:r>
             <a:r>
               <a:rPr lang="en-US" sz="3200" b="1" dirty="0"/>
-              <a:t>WorkWithSeth</a:t>
+              <a:t>WFHTester</a:t>
             </a:r>
             <a:endParaRPr lang="en-US" sz="2800" b="1" dirty="0"/>
           </a:p>
@@ -11571,11 +11571,11 @@
   <p:clrMapOvr>
     <a:masterClrMapping/>
   </p:clrMapOvr>
-  <mc:AlternateContent xmlns:mc="http://schemas.openxmlformats.org/markup-compatibility/2006">
-    <mc:Choice xmlns:p14="http://schemas.microsoft.com/office/powerpoint/2010/main" Requires="p14">
+  <mc:AlternateContent xmlns:mc="http://schemas.openxmlformats.org/markup-compatibility/2006" xmlns:p14="http://schemas.microsoft.com/office/powerpoint/2010/main">
+    <mc:Choice Requires="p14">
       <p:transition p14:dur="10" advClick="0" advTm="10000"/>
     </mc:Choice>
-    <mc:Fallback>
+    <mc:Fallback xmlns="">
       <p:transition advClick="0" advTm="10000"/>
     </mc:Fallback>
   </mc:AlternateContent>
@@ -11813,7 +11813,7 @@
                 </a:solidFill>
                 <a:latin typeface="Corbel" panose="020B0503020204020204" pitchFamily="34" charset="0"/>
               </a:rPr>
-              <a:t>* 1 or 2 face-to-face days per month in Columbus, OH</a:t>
+              <a:t>* 2 or more face-to-face days per month in Columbus, OH</a:t>
             </a:r>
             <a:endParaRPr lang="en-US" sz="2800" dirty="0"/>
           </a:p>
@@ -11854,7 +11854,7 @@
             </a:r>
             <a:r>
               <a:rPr lang="en-US" sz="3200" b="1" dirty="0"/>
-              <a:t>WorkWithSeth</a:t>
+              <a:t>WFHTester</a:t>
             </a:r>
             <a:endParaRPr lang="en-US" sz="2800" b="1" dirty="0"/>
           </a:p>
@@ -11968,11 +11968,11 @@
   <p:clrMapOvr>
     <a:masterClrMapping/>
   </p:clrMapOvr>
-  <mc:AlternateContent xmlns:mc="http://schemas.openxmlformats.org/markup-compatibility/2006">
-    <mc:Choice xmlns:p14="http://schemas.microsoft.com/office/powerpoint/2010/main" Requires="p14">
+  <mc:AlternateContent xmlns:mc="http://schemas.openxmlformats.org/markup-compatibility/2006" xmlns:p14="http://schemas.microsoft.com/office/powerpoint/2010/main">
+    <mc:Choice Requires="p14">
       <p:transition p14:dur="10" advClick="0" advTm="10000"/>
     </mc:Choice>
-    <mc:Fallback>
+    <mc:Fallback xmlns="">
       <p:transition advClick="0" advTm="10000"/>
     </mc:Fallback>
   </mc:AlternateContent>
@@ -12210,7 +12210,7 @@
                 </a:solidFill>
                 <a:latin typeface="Corbel" panose="020B0503020204020204" pitchFamily="34" charset="0"/>
               </a:rPr>
-              <a:t>* 1 or 2 face-to-face days per month in Columbus, OH</a:t>
+              <a:t>* 2 or more face-to-face days per month in Columbus, OH</a:t>
             </a:r>
             <a:endParaRPr lang="en-US" sz="2800" dirty="0"/>
           </a:p>
@@ -12251,7 +12251,7 @@
             </a:r>
             <a:r>
               <a:rPr lang="en-US" sz="3200" b="1" dirty="0"/>
-              <a:t>WorkWithSeth</a:t>
+              <a:t>WFHTester</a:t>
             </a:r>
             <a:endParaRPr lang="en-US" sz="2800" b="1" dirty="0"/>
           </a:p>
@@ -12365,11 +12365,11 @@
   <p:clrMapOvr>
     <a:masterClrMapping/>
   </p:clrMapOvr>
-  <mc:AlternateContent xmlns:mc="http://schemas.openxmlformats.org/markup-compatibility/2006">
-    <mc:Choice xmlns:p14="http://schemas.microsoft.com/office/powerpoint/2010/main" Requires="p14">
+  <mc:AlternateContent xmlns:mc="http://schemas.openxmlformats.org/markup-compatibility/2006" xmlns:p14="http://schemas.microsoft.com/office/powerpoint/2010/main">
+    <mc:Choice Requires="p14">
       <p:transition p14:dur="10" advClick="0" advTm="10000"/>
     </mc:Choice>
-    <mc:Fallback>
+    <mc:Fallback xmlns="">
       <p:transition advClick="0" advTm="10000"/>
     </mc:Fallback>
   </mc:AlternateContent>
@@ -12607,7 +12607,7 @@
                 </a:solidFill>
                 <a:latin typeface="Corbel" panose="020B0503020204020204" pitchFamily="34" charset="0"/>
               </a:rPr>
-              <a:t>* 1 or 2 face-to-face days per month in Columbus, OH</a:t>
+              <a:t>* 2 or more face-to-face days per month in Columbus, OH</a:t>
             </a:r>
             <a:endParaRPr lang="en-US" sz="2800" dirty="0"/>
           </a:p>
@@ -12648,7 +12648,7 @@
             </a:r>
             <a:r>
               <a:rPr lang="en-US" sz="3200" b="1" dirty="0"/>
-              <a:t>WorkWithSeth</a:t>
+              <a:t>WFHTester</a:t>
             </a:r>
             <a:endParaRPr lang="en-US" sz="2800" b="1" dirty="0"/>
           </a:p>
@@ -12762,11 +12762,11 @@
   <p:clrMapOvr>
     <a:masterClrMapping/>
   </p:clrMapOvr>
-  <mc:AlternateContent xmlns:mc="http://schemas.openxmlformats.org/markup-compatibility/2006">
-    <mc:Choice xmlns:p14="http://schemas.microsoft.com/office/powerpoint/2010/main" Requires="p14">
+  <mc:AlternateContent xmlns:mc="http://schemas.openxmlformats.org/markup-compatibility/2006" xmlns:p14="http://schemas.microsoft.com/office/powerpoint/2010/main">
+    <mc:Choice Requires="p14">
       <p:transition p14:dur="10" advClick="0" advTm="10000"/>
     </mc:Choice>
-    <mc:Fallback>
+    <mc:Fallback xmlns="">
       <p:transition advClick="0" advTm="10000"/>
     </mc:Fallback>
   </mc:AlternateContent>
@@ -14033,11 +14033,11 @@
   <p:clrMapOvr>
     <a:masterClrMapping/>
   </p:clrMapOvr>
-  <mc:AlternateContent xmlns:mc="http://schemas.openxmlformats.org/markup-compatibility/2006">
-    <mc:Choice xmlns:p14="http://schemas.microsoft.com/office/powerpoint/2010/main" Requires="p14">
+  <mc:AlternateContent xmlns:mc="http://schemas.openxmlformats.org/markup-compatibility/2006" xmlns:p14="http://schemas.microsoft.com/office/powerpoint/2010/main">
+    <mc:Choice Requires="p14">
       <p:transition p14:dur="10" advClick="0" advTm="10000"/>
     </mc:Choice>
-    <mc:Fallback>
+    <mc:Fallback xmlns="">
       <p:transition advClick="0" advTm="10000"/>
     </mc:Fallback>
   </mc:AlternateContent>
@@ -14275,7 +14275,7 @@
                 </a:solidFill>
                 <a:latin typeface="Corbel" panose="020B0503020204020204" pitchFamily="34" charset="0"/>
               </a:rPr>
-              <a:t>* 1 or 2 face-to-face days per month in Columbus, OH</a:t>
+              <a:t>* 2 or more face-to-face days per month in Columbus, OH</a:t>
             </a:r>
             <a:endParaRPr lang="en-US" sz="2800" dirty="0"/>
           </a:p>
@@ -14316,7 +14316,7 @@
             </a:r>
             <a:r>
               <a:rPr lang="en-US" sz="3200" b="1" dirty="0"/>
-              <a:t>WorkWithSeth</a:t>
+              <a:t>WFHTester</a:t>
             </a:r>
             <a:endParaRPr lang="en-US" sz="2800" b="1" dirty="0"/>
           </a:p>
@@ -14430,11 +14430,11 @@
   <p:clrMapOvr>
     <a:masterClrMapping/>
   </p:clrMapOvr>
-  <mc:AlternateContent xmlns:mc="http://schemas.openxmlformats.org/markup-compatibility/2006">
-    <mc:Choice xmlns:p14="http://schemas.microsoft.com/office/powerpoint/2010/main" Requires="p14">
+  <mc:AlternateContent xmlns:mc="http://schemas.openxmlformats.org/markup-compatibility/2006" xmlns:p14="http://schemas.microsoft.com/office/powerpoint/2010/main">
+    <mc:Choice Requires="p14">
       <p:transition p14:dur="10" advClick="0" advTm="10000"/>
     </mc:Choice>
-    <mc:Fallback>
+    <mc:Fallback xmlns="">
       <p:transition advClick="0" advTm="10000"/>
     </mc:Fallback>
   </mc:AlternateContent>
@@ -14672,7 +14672,7 @@
                 </a:solidFill>
                 <a:latin typeface="Corbel" panose="020B0503020204020204" pitchFamily="34" charset="0"/>
               </a:rPr>
-              <a:t>* 1 or 2 face-to-face days per month in Columbus, OH</a:t>
+              <a:t>* 2 or more face-to-face days per month in Columbus, OH</a:t>
             </a:r>
             <a:endParaRPr lang="en-US" sz="2800" dirty="0"/>
           </a:p>
@@ -14713,7 +14713,7 @@
             </a:r>
             <a:r>
               <a:rPr lang="en-US" sz="3200" b="1" dirty="0"/>
-              <a:t>WorkWithSeth</a:t>
+              <a:t>WFHTester</a:t>
             </a:r>
             <a:endParaRPr lang="en-US" sz="2800" b="1" dirty="0"/>
           </a:p>
@@ -14827,11 +14827,11 @@
   <p:clrMapOvr>
     <a:masterClrMapping/>
   </p:clrMapOvr>
-  <mc:AlternateContent xmlns:mc="http://schemas.openxmlformats.org/markup-compatibility/2006">
-    <mc:Choice xmlns:p14="http://schemas.microsoft.com/office/powerpoint/2010/main" Requires="p14">
+  <mc:AlternateContent xmlns:mc="http://schemas.openxmlformats.org/markup-compatibility/2006" xmlns:p14="http://schemas.microsoft.com/office/powerpoint/2010/main">
+    <mc:Choice Requires="p14">
       <p:transition p14:dur="10" advClick="0" advTm="10000"/>
     </mc:Choice>
-    <mc:Fallback>
+    <mc:Fallback xmlns="">
       <p:transition advClick="0" advTm="10000"/>
     </mc:Fallback>
   </mc:AlternateContent>
@@ -15069,7 +15069,7 @@
                 </a:solidFill>
                 <a:latin typeface="Corbel" panose="020B0503020204020204" pitchFamily="34" charset="0"/>
               </a:rPr>
-              <a:t>* 1 or 2 face-to-face days per month in Columbus, OH</a:t>
+              <a:t>* 2 or more face-to-face days per month in Columbus, OH</a:t>
             </a:r>
             <a:endParaRPr lang="en-US" sz="2800" dirty="0"/>
           </a:p>
@@ -15110,7 +15110,7 @@
             </a:r>
             <a:r>
               <a:rPr lang="en-US" sz="3200" b="1" dirty="0"/>
-              <a:t>WorkWithSeth</a:t>
+              <a:t>WFHTester</a:t>
             </a:r>
             <a:endParaRPr lang="en-US" sz="2800" b="1" dirty="0"/>
           </a:p>
@@ -15224,11 +15224,11 @@
   <p:clrMapOvr>
     <a:masterClrMapping/>
   </p:clrMapOvr>
-  <mc:AlternateContent xmlns:mc="http://schemas.openxmlformats.org/markup-compatibility/2006">
-    <mc:Choice xmlns:p14="http://schemas.microsoft.com/office/powerpoint/2010/main" Requires="p14">
+  <mc:AlternateContent xmlns:mc="http://schemas.openxmlformats.org/markup-compatibility/2006" xmlns:p14="http://schemas.microsoft.com/office/powerpoint/2010/main">
+    <mc:Choice Requires="p14">
       <p:transition p14:dur="10" advClick="0" advTm="10000"/>
     </mc:Choice>
-    <mc:Fallback>
+    <mc:Fallback xmlns="">
       <p:transition advClick="0" advTm="10000"/>
     </mc:Fallback>
   </mc:AlternateContent>
@@ -15466,7 +15466,7 @@
                 </a:solidFill>
                 <a:latin typeface="Corbel" panose="020B0503020204020204" pitchFamily="34" charset="0"/>
               </a:rPr>
-              <a:t>* 1 or 2 face-to-face days per month in Columbus, OH</a:t>
+              <a:t>* 2 or more face-to-face days per month in Columbus, OH</a:t>
             </a:r>
             <a:endParaRPr lang="en-US" sz="2800" dirty="0"/>
           </a:p>
@@ -15507,7 +15507,7 @@
             </a:r>
             <a:r>
               <a:rPr lang="en-US" sz="3200" b="1" dirty="0"/>
-              <a:t>WorkWithSeth</a:t>
+              <a:t>WFHTester</a:t>
             </a:r>
             <a:endParaRPr lang="en-US" sz="2800" b="1" dirty="0"/>
           </a:p>
@@ -15621,11 +15621,11 @@
   <p:clrMapOvr>
     <a:masterClrMapping/>
   </p:clrMapOvr>
-  <mc:AlternateContent xmlns:mc="http://schemas.openxmlformats.org/markup-compatibility/2006">
-    <mc:Choice xmlns:p14="http://schemas.microsoft.com/office/powerpoint/2010/main" Requires="p14">
+  <mc:AlternateContent xmlns:mc="http://schemas.openxmlformats.org/markup-compatibility/2006" xmlns:p14="http://schemas.microsoft.com/office/powerpoint/2010/main">
+    <mc:Choice Requires="p14">
       <p:transition p14:dur="10" advClick="0" advTm="10000"/>
     </mc:Choice>
-    <mc:Fallback>
+    <mc:Fallback xmlns="">
       <p:transition advClick="0" advTm="10000"/>
     </mc:Fallback>
   </mc:AlternateContent>
@@ -15863,7 +15863,7 @@
                 </a:solidFill>
                 <a:latin typeface="Corbel" panose="020B0503020204020204" pitchFamily="34" charset="0"/>
               </a:rPr>
-              <a:t>* 1 or 2 face-to-face days per month in Columbus, OH</a:t>
+              <a:t>* 2 or more face-to-face days per month in Columbus, OH</a:t>
             </a:r>
             <a:endParaRPr lang="en-US" sz="2800" dirty="0"/>
           </a:p>
@@ -15904,7 +15904,7 @@
             </a:r>
             <a:r>
               <a:rPr lang="en-US" sz="3200" b="1" dirty="0"/>
-              <a:t>WorkWithSeth</a:t>
+              <a:t>WFHTester</a:t>
             </a:r>
             <a:endParaRPr lang="en-US" sz="2800" b="1" dirty="0"/>
           </a:p>
@@ -16018,11 +16018,11 @@
   <p:clrMapOvr>
     <a:masterClrMapping/>
   </p:clrMapOvr>
-  <mc:AlternateContent xmlns:mc="http://schemas.openxmlformats.org/markup-compatibility/2006">
-    <mc:Choice xmlns:p14="http://schemas.microsoft.com/office/powerpoint/2010/main" Requires="p14">
+  <mc:AlternateContent xmlns:mc="http://schemas.openxmlformats.org/markup-compatibility/2006" xmlns:p14="http://schemas.microsoft.com/office/powerpoint/2010/main">
+    <mc:Choice Requires="p14">
       <p:transition p14:dur="10" advClick="0" advTm="10000"/>
     </mc:Choice>
-    <mc:Fallback>
+    <mc:Fallback xmlns="">
       <p:transition advClick="0" advTm="10000"/>
     </mc:Fallback>
   </mc:AlternateContent>
@@ -16260,7 +16260,7 @@
                 </a:solidFill>
                 <a:latin typeface="Corbel" panose="020B0503020204020204" pitchFamily="34" charset="0"/>
               </a:rPr>
-              <a:t>* 1 or 2 face-to-face days per month in Columbus, OH</a:t>
+              <a:t>* 2 or more face-to-face days per month in Columbus, OH</a:t>
             </a:r>
             <a:endParaRPr lang="en-US" sz="2800" dirty="0"/>
           </a:p>
@@ -16301,7 +16301,7 @@
             </a:r>
             <a:r>
               <a:rPr lang="en-US" sz="3200" b="1" dirty="0"/>
-              <a:t>WorkWithSeth</a:t>
+              <a:t>WFHTester</a:t>
             </a:r>
             <a:endParaRPr lang="en-US" sz="2800" b="1" dirty="0"/>
           </a:p>
@@ -16415,11 +16415,11 @@
   <p:clrMapOvr>
     <a:masterClrMapping/>
   </p:clrMapOvr>
-  <mc:AlternateContent xmlns:mc="http://schemas.openxmlformats.org/markup-compatibility/2006">
-    <mc:Choice xmlns:p14="http://schemas.microsoft.com/office/powerpoint/2010/main" Requires="p14">
+  <mc:AlternateContent xmlns:mc="http://schemas.openxmlformats.org/markup-compatibility/2006" xmlns:p14="http://schemas.microsoft.com/office/powerpoint/2010/main">
+    <mc:Choice Requires="p14">
       <p:transition p14:dur="10" advClick="0" advTm="10000"/>
     </mc:Choice>
-    <mc:Fallback>
+    <mc:Fallback xmlns="">
       <p:transition advClick="0" advTm="10000"/>
     </mc:Fallback>
   </mc:AlternateContent>
@@ -16657,7 +16657,7 @@
                 </a:solidFill>
                 <a:latin typeface="Corbel" panose="020B0503020204020204" pitchFamily="34" charset="0"/>
               </a:rPr>
-              <a:t>* 1 or 2 face-to-face days per month in Columbus, OH</a:t>
+              <a:t>* 2 or more face-to-face days per month in Columbus, OH</a:t>
             </a:r>
             <a:endParaRPr lang="en-US" sz="2800" dirty="0"/>
           </a:p>
@@ -16698,7 +16698,7 @@
             </a:r>
             <a:r>
               <a:rPr lang="en-US" sz="3200" b="1" dirty="0"/>
-              <a:t>WorkWithSeth</a:t>
+              <a:t>WFHTester</a:t>
             </a:r>
             <a:endParaRPr lang="en-US" sz="2800" b="1" dirty="0"/>
           </a:p>
@@ -16795,11 +16795,11 @@
   <p:clrMapOvr>
     <a:masterClrMapping/>
   </p:clrMapOvr>
-  <mc:AlternateContent xmlns:mc="http://schemas.openxmlformats.org/markup-compatibility/2006">
-    <mc:Choice xmlns:p14="http://schemas.microsoft.com/office/powerpoint/2010/main" Requires="p14">
+  <mc:AlternateContent xmlns:mc="http://schemas.openxmlformats.org/markup-compatibility/2006" xmlns:p14="http://schemas.microsoft.com/office/powerpoint/2010/main">
+    <mc:Choice Requires="p14">
       <p:transition p14:dur="10" advClick="0" advTm="10000"/>
     </mc:Choice>
-    <mc:Fallback>
+    <mc:Fallback xmlns="">
       <p:transition advClick="0" advTm="10000"/>
     </mc:Fallback>
   </mc:AlternateContent>
@@ -17084,7 +17084,7 @@
                 </a:solidFill>
                 <a:latin typeface="Corbel" panose="020B0503020204020204" pitchFamily="34" charset="0"/>
               </a:rPr>
-              <a:t>* 1 or 2 face-to-face days per month in Columbus, OH</a:t>
+              <a:t>* 2 or more face-to-face days per month in Columbus, OH</a:t>
             </a:r>
             <a:endParaRPr lang="en-US" sz="2800" dirty="0"/>
           </a:p>
@@ -17125,7 +17125,7 @@
             </a:r>
             <a:r>
               <a:rPr lang="en-US" sz="3200" b="1" dirty="0"/>
-              <a:t>WorkWithSeth</a:t>
+              <a:t>WFHTester</a:t>
             </a:r>
             <a:endParaRPr lang="en-US" sz="2800" b="1" dirty="0"/>
           </a:p>
@@ -17192,11 +17192,11 @@
   <p:clrMapOvr>
     <a:masterClrMapping/>
   </p:clrMapOvr>
-  <mc:AlternateContent xmlns:mc="http://schemas.openxmlformats.org/markup-compatibility/2006">
-    <mc:Choice xmlns:p14="http://schemas.microsoft.com/office/powerpoint/2010/main" Requires="p14">
+  <mc:AlternateContent xmlns:mc="http://schemas.openxmlformats.org/markup-compatibility/2006" xmlns:p14="http://schemas.microsoft.com/office/powerpoint/2010/main">
+    <mc:Choice Requires="p14">
       <p:transition p14:dur="10" advClick="0" advTm="10000"/>
     </mc:Choice>
-    <mc:Fallback>
+    <mc:Fallback xmlns="">
       <p:transition advClick="0" advTm="10000"/>
     </mc:Fallback>
   </mc:AlternateContent>
@@ -17434,7 +17434,7 @@
                 </a:solidFill>
                 <a:latin typeface="Corbel" panose="020B0503020204020204" pitchFamily="34" charset="0"/>
               </a:rPr>
-              <a:t>* 1 or 2 face-to-face days per month in Columbus, OH</a:t>
+              <a:t>* 2 or more face-to-face days per month in Columbus, OH</a:t>
             </a:r>
             <a:endParaRPr lang="en-US" sz="2800" dirty="0"/>
           </a:p>
@@ -17475,7 +17475,7 @@
             </a:r>
             <a:r>
               <a:rPr lang="en-US" sz="3200" b="1" dirty="0"/>
-              <a:t>WorkWithSeth</a:t>
+              <a:t>WFHTester</a:t>
             </a:r>
             <a:endParaRPr lang="en-US" sz="2800" b="1" dirty="0"/>
           </a:p>
@@ -17589,11 +17589,11 @@
   <p:clrMapOvr>
     <a:masterClrMapping/>
   </p:clrMapOvr>
-  <mc:AlternateContent xmlns:mc="http://schemas.openxmlformats.org/markup-compatibility/2006">
-    <mc:Choice xmlns:p14="http://schemas.microsoft.com/office/powerpoint/2010/main" Requires="p14">
+  <mc:AlternateContent xmlns:mc="http://schemas.openxmlformats.org/markup-compatibility/2006" xmlns:p14="http://schemas.microsoft.com/office/powerpoint/2010/main">
+    <mc:Choice Requires="p14">
       <p:transition p14:dur="10" advClick="0" advTm="10000"/>
     </mc:Choice>
-    <mc:Fallback>
+    <mc:Fallback xmlns="">
       <p:transition advClick="0" advTm="10000"/>
     </mc:Fallback>
   </mc:AlternateContent>
@@ -17831,7 +17831,7 @@
                 </a:solidFill>
                 <a:latin typeface="Corbel" panose="020B0503020204020204" pitchFamily="34" charset="0"/>
               </a:rPr>
-              <a:t>* 1 or 2 face-to-face days per month in Columbus, OH</a:t>
+              <a:t>* 2 or more face-to-face days per month in Columbus, OH</a:t>
             </a:r>
             <a:endParaRPr lang="en-US" sz="2800" dirty="0"/>
           </a:p>
@@ -17872,7 +17872,7 @@
             </a:r>
             <a:r>
               <a:rPr lang="en-US" sz="3200" b="1" dirty="0"/>
-              <a:t>WorkWithSeth</a:t>
+              <a:t>WFHTester</a:t>
             </a:r>
             <a:endParaRPr lang="en-US" sz="2800" b="1" dirty="0"/>
           </a:p>
@@ -17986,11 +17986,11 @@
   <p:clrMapOvr>
     <a:masterClrMapping/>
   </p:clrMapOvr>
-  <mc:AlternateContent xmlns:mc="http://schemas.openxmlformats.org/markup-compatibility/2006">
-    <mc:Choice xmlns:p14="http://schemas.microsoft.com/office/powerpoint/2010/main" Requires="p14">
+  <mc:AlternateContent xmlns:mc="http://schemas.openxmlformats.org/markup-compatibility/2006" xmlns:p14="http://schemas.microsoft.com/office/powerpoint/2010/main">
+    <mc:Choice Requires="p14">
       <p:transition p14:dur="10" advClick="0" advTm="10000"/>
     </mc:Choice>
-    <mc:Fallback>
+    <mc:Fallback xmlns="">
       <p:transition advClick="0" advTm="10000"/>
     </mc:Fallback>
   </mc:AlternateContent>
@@ -18228,7 +18228,7 @@
                 </a:solidFill>
                 <a:latin typeface="Corbel" panose="020B0503020204020204" pitchFamily="34" charset="0"/>
               </a:rPr>
-              <a:t>* 1 or 2 face-to-face days per month in Columbus, OH</a:t>
+              <a:t>* 2 or more face-to-face days per month in Columbus, OH</a:t>
             </a:r>
             <a:endParaRPr lang="en-US" sz="2800" dirty="0"/>
           </a:p>
@@ -18269,7 +18269,7 @@
             </a:r>
             <a:r>
               <a:rPr lang="en-US" sz="3200" b="1" dirty="0"/>
-              <a:t>WorkWithSeth</a:t>
+              <a:t>WFHTester</a:t>
             </a:r>
             <a:endParaRPr lang="en-US" sz="2800" b="1" dirty="0"/>
           </a:p>
@@ -18383,11 +18383,11 @@
   <p:clrMapOvr>
     <a:masterClrMapping/>
   </p:clrMapOvr>
-  <mc:AlternateContent xmlns:mc="http://schemas.openxmlformats.org/markup-compatibility/2006">
-    <mc:Choice xmlns:p14="http://schemas.microsoft.com/office/powerpoint/2010/main" Requires="p14">
+  <mc:AlternateContent xmlns:mc="http://schemas.openxmlformats.org/markup-compatibility/2006" xmlns:p14="http://schemas.microsoft.com/office/powerpoint/2010/main">
+    <mc:Choice Requires="p14">
       <p:transition p14:dur="10" advClick="0" advTm="10000"/>
     </mc:Choice>
-    <mc:Fallback>
+    <mc:Fallback xmlns="">
       <p:transition advClick="0" advTm="10000"/>
     </mc:Fallback>
   </mc:AlternateContent>
@@ -18625,7 +18625,7 @@
                 </a:solidFill>
                 <a:latin typeface="Corbel" panose="020B0503020204020204" pitchFamily="34" charset="0"/>
               </a:rPr>
-              <a:t>* 1 or 2 face-to-face days per month in Columbus, OH</a:t>
+              <a:t>* 2 or more face-to-face days per month in Columbus, OH</a:t>
             </a:r>
             <a:endParaRPr lang="en-US" sz="2800" dirty="0"/>
           </a:p>
@@ -18666,7 +18666,7 @@
             </a:r>
             <a:r>
               <a:rPr lang="en-US" sz="3200" b="1" dirty="0"/>
-              <a:t>WorkWithSeth</a:t>
+              <a:t>WFHTester</a:t>
             </a:r>
             <a:endParaRPr lang="en-US" sz="2800" b="1" dirty="0"/>
           </a:p>
@@ -18780,11 +18780,11 @@
   <p:clrMapOvr>
     <a:masterClrMapping/>
   </p:clrMapOvr>
-  <mc:AlternateContent xmlns:mc="http://schemas.openxmlformats.org/markup-compatibility/2006">
-    <mc:Choice xmlns:p14="http://schemas.microsoft.com/office/powerpoint/2010/main" Requires="p14">
+  <mc:AlternateContent xmlns:mc="http://schemas.openxmlformats.org/markup-compatibility/2006" xmlns:p14="http://schemas.microsoft.com/office/powerpoint/2010/main">
+    <mc:Choice Requires="p14">
       <p:transition p14:dur="10" advClick="0" advTm="10000"/>
     </mc:Choice>
-    <mc:Fallback>
+    <mc:Fallback xmlns="">
       <p:transition advClick="0" advTm="10000"/>
     </mc:Fallback>
   </mc:AlternateContent>
@@ -20051,11 +20051,11 @@
   <p:clrMapOvr>
     <a:masterClrMapping/>
   </p:clrMapOvr>
-  <mc:AlternateContent xmlns:mc="http://schemas.openxmlformats.org/markup-compatibility/2006">
-    <mc:Choice xmlns:p14="http://schemas.microsoft.com/office/powerpoint/2010/main" Requires="p14">
+  <mc:AlternateContent xmlns:mc="http://schemas.openxmlformats.org/markup-compatibility/2006" xmlns:p14="http://schemas.microsoft.com/office/powerpoint/2010/main">
+    <mc:Choice Requires="p14">
       <p:transition p14:dur="10" advClick="0" advTm="10000"/>
     </mc:Choice>
-    <mc:Fallback>
+    <mc:Fallback xmlns="">
       <p:transition advClick="0" advTm="10000"/>
     </mc:Fallback>
   </mc:AlternateContent>
@@ -20293,7 +20293,7 @@
                 </a:solidFill>
                 <a:latin typeface="Corbel" panose="020B0503020204020204" pitchFamily="34" charset="0"/>
               </a:rPr>
-              <a:t>* 1 or 2 face-to-face days per month in Columbus, OH</a:t>
+              <a:t>* 2 or more face-to-face days per month in Columbus, OH</a:t>
             </a:r>
             <a:endParaRPr lang="en-US" sz="2800" dirty="0"/>
           </a:p>
@@ -20334,7 +20334,7 @@
             </a:r>
             <a:r>
               <a:rPr lang="en-US" sz="3200" b="1" dirty="0"/>
-              <a:t>WorkWithSeth</a:t>
+              <a:t>WFHTester</a:t>
             </a:r>
             <a:endParaRPr lang="en-US" sz="2800" b="1" dirty="0"/>
           </a:p>
@@ -20448,11 +20448,11 @@
   <p:clrMapOvr>
     <a:masterClrMapping/>
   </p:clrMapOvr>
-  <mc:AlternateContent xmlns:mc="http://schemas.openxmlformats.org/markup-compatibility/2006">
-    <mc:Choice xmlns:p14="http://schemas.microsoft.com/office/powerpoint/2010/main" Requires="p14">
+  <mc:AlternateContent xmlns:mc="http://schemas.openxmlformats.org/markup-compatibility/2006" xmlns:p14="http://schemas.microsoft.com/office/powerpoint/2010/main">
+    <mc:Choice Requires="p14">
       <p:transition p14:dur="10" advClick="0" advTm="10000"/>
     </mc:Choice>
-    <mc:Fallback>
+    <mc:Fallback xmlns="">
       <p:transition advClick="0" advTm="10000"/>
     </mc:Fallback>
   </mc:AlternateContent>

</xml_diff>